<commit_message>
Update Glasswall Presentation Template.pptx
</commit_message>
<xml_diff>
--- a/01_Templates/PowerPoint Templates/Glasswall Presentation Template.pptx
+++ b/01_Templates/PowerPoint Templates/Glasswall Presentation Template.pptx
@@ -232,7 +232,7 @@
           <a:p>
             <a:fld id="{2113C5A2-7F82-40B5-B1A0-384AF1A6DF2F}" type="datetimeFigureOut">
               <a:rPr lang="en-GB" smtClean="0"/>
-              <a:t>27/02/2020</a:t>
+              <a:t>24/04/2020</a:t>
             </a:fld>
             <a:endParaRPr lang="en-GB"/>
           </a:p>
@@ -409,7 +409,7 @@
           <a:p>
             <a:fld id="{C8FD563A-8BB0-42A1-B52C-FFD092FC2B78}" type="datetimeFigureOut">
               <a:rPr lang="en-GB" smtClean="0"/>
-              <a:t>27/02/2020</a:t>
+              <a:t>24/04/2020</a:t>
             </a:fld>
             <a:endParaRPr lang="en-GB"/>
           </a:p>
@@ -1093,6 +1093,53 @@
           </a:p>
         </p:txBody>
       </p:sp>
+      <p:sp>
+        <p:nvSpPr>
+          <p:cNvPr id="13" name="Slide Number Placeholder 1">
+            <a:extLst>
+              <a:ext uri="{FF2B5EF4-FFF2-40B4-BE49-F238E27FC236}">
+                <a16:creationId xmlns:a16="http://schemas.microsoft.com/office/drawing/2014/main" id="{77C3E452-9F2C-4924-A4D5-C0442FBD317A}"/>
+              </a:ext>
+            </a:extLst>
+          </p:cNvPr>
+          <p:cNvSpPr>
+            <a:spLocks noGrp="1"/>
+          </p:cNvSpPr>
+          <p:nvPr>
+            <p:ph type="sldNum" sz="quarter" idx="4"/>
+          </p:nvPr>
+        </p:nvSpPr>
+        <p:spPr>
+          <a:xfrm>
+            <a:off x="9123218" y="6328641"/>
+            <a:ext cx="2743200" cy="365125"/>
+          </a:xfrm>
+          <a:prstGeom prst="rect">
+            <a:avLst/>
+          </a:prstGeom>
+        </p:spPr>
+        <p:txBody>
+          <a:bodyPr vert="horz" lIns="91440" tIns="45720" rIns="91440" bIns="45720" rtlCol="0" anchor="ctr"/>
+          <a:lstStyle>
+            <a:lvl1pPr algn="r">
+              <a:defRPr sz="1200">
+                <a:solidFill>
+                  <a:schemeClr val="tx1">
+                    <a:tint val="75000"/>
+                  </a:schemeClr>
+                </a:solidFill>
+              </a:defRPr>
+            </a:lvl1pPr>
+          </a:lstStyle>
+          <a:p>
+            <a:fld id="{4D95382D-0D49-4DA8-905C-596FF0813096}" type="slidenum">
+              <a:rPr lang="en-US" smtClean="0"/>
+              <a:t>‹#›</a:t>
+            </a:fld>
+            <a:endParaRPr lang="en-US"/>
+          </a:p>
+        </p:txBody>
+      </p:sp>
     </p:spTree>
     <p:extLst>
       <p:ext uri="{BB962C8B-B14F-4D97-AF65-F5344CB8AC3E}">
@@ -1300,6 +1347,53 @@
           </a:fontRef>
         </p:style>
       </p:cxnSp>
+      <p:sp>
+        <p:nvSpPr>
+          <p:cNvPr id="6" name="Slide Number Placeholder 1">
+            <a:extLst>
+              <a:ext uri="{FF2B5EF4-FFF2-40B4-BE49-F238E27FC236}">
+                <a16:creationId xmlns:a16="http://schemas.microsoft.com/office/drawing/2014/main" id="{104806A9-9795-4CE4-BFC3-396300565A06}"/>
+              </a:ext>
+            </a:extLst>
+          </p:cNvPr>
+          <p:cNvSpPr>
+            <a:spLocks noGrp="1"/>
+          </p:cNvSpPr>
+          <p:nvPr>
+            <p:ph type="sldNum" sz="quarter" idx="4"/>
+          </p:nvPr>
+        </p:nvSpPr>
+        <p:spPr>
+          <a:xfrm>
+            <a:off x="9123218" y="6328641"/>
+            <a:ext cx="2743200" cy="365125"/>
+          </a:xfrm>
+          <a:prstGeom prst="rect">
+            <a:avLst/>
+          </a:prstGeom>
+        </p:spPr>
+        <p:txBody>
+          <a:bodyPr vert="horz" lIns="91440" tIns="45720" rIns="91440" bIns="45720" rtlCol="0" anchor="ctr"/>
+          <a:lstStyle>
+            <a:lvl1pPr algn="r">
+              <a:defRPr sz="1200">
+                <a:solidFill>
+                  <a:schemeClr val="tx1">
+                    <a:tint val="75000"/>
+                  </a:schemeClr>
+                </a:solidFill>
+              </a:defRPr>
+            </a:lvl1pPr>
+          </a:lstStyle>
+          <a:p>
+            <a:fld id="{4D95382D-0D49-4DA8-905C-596FF0813096}" type="slidenum">
+              <a:rPr lang="en-US" smtClean="0"/>
+              <a:t>‹#›</a:t>
+            </a:fld>
+            <a:endParaRPr lang="en-US"/>
+          </a:p>
+        </p:txBody>
+      </p:sp>
     </p:spTree>
     <p:extLst>
       <p:ext uri="{BB962C8B-B14F-4D97-AF65-F5344CB8AC3E}">
@@ -1810,6 +1904,53 @@
           </a:p>
         </p:txBody>
       </p:sp>
+      <p:sp>
+        <p:nvSpPr>
+          <p:cNvPr id="13" name="Slide Number Placeholder 1">
+            <a:extLst>
+              <a:ext uri="{FF2B5EF4-FFF2-40B4-BE49-F238E27FC236}">
+                <a16:creationId xmlns:a16="http://schemas.microsoft.com/office/drawing/2014/main" id="{D4DBE863-BA53-4E20-A31D-29E1FF4B884A}"/>
+              </a:ext>
+            </a:extLst>
+          </p:cNvPr>
+          <p:cNvSpPr>
+            <a:spLocks noGrp="1"/>
+          </p:cNvSpPr>
+          <p:nvPr>
+            <p:ph type="sldNum" sz="quarter" idx="4"/>
+          </p:nvPr>
+        </p:nvSpPr>
+        <p:spPr>
+          <a:xfrm>
+            <a:off x="9123218" y="6328641"/>
+            <a:ext cx="2743200" cy="365125"/>
+          </a:xfrm>
+          <a:prstGeom prst="rect">
+            <a:avLst/>
+          </a:prstGeom>
+        </p:spPr>
+        <p:txBody>
+          <a:bodyPr vert="horz" lIns="91440" tIns="45720" rIns="91440" bIns="45720" rtlCol="0" anchor="ctr"/>
+          <a:lstStyle>
+            <a:lvl1pPr algn="r">
+              <a:defRPr sz="1200">
+                <a:solidFill>
+                  <a:schemeClr val="tx1">
+                    <a:tint val="75000"/>
+                  </a:schemeClr>
+                </a:solidFill>
+              </a:defRPr>
+            </a:lvl1pPr>
+          </a:lstStyle>
+          <a:p>
+            <a:fld id="{4D95382D-0D49-4DA8-905C-596FF0813096}" type="slidenum">
+              <a:rPr lang="en-US" smtClean="0"/>
+              <a:t>‹#›</a:t>
+            </a:fld>
+            <a:endParaRPr lang="en-US"/>
+          </a:p>
+        </p:txBody>
+      </p:sp>
     </p:spTree>
     <p:extLst>
       <p:ext uri="{BB962C8B-B14F-4D97-AF65-F5344CB8AC3E}">
@@ -2042,6 +2183,53 @@
           </a:fontRef>
         </p:style>
       </p:cxnSp>
+      <p:sp>
+        <p:nvSpPr>
+          <p:cNvPr id="7" name="Slide Number Placeholder 1">
+            <a:extLst>
+              <a:ext uri="{FF2B5EF4-FFF2-40B4-BE49-F238E27FC236}">
+                <a16:creationId xmlns:a16="http://schemas.microsoft.com/office/drawing/2014/main" id="{38205AB0-A80C-4704-A2F5-C64C4EC4AF46}"/>
+              </a:ext>
+            </a:extLst>
+          </p:cNvPr>
+          <p:cNvSpPr>
+            <a:spLocks noGrp="1"/>
+          </p:cNvSpPr>
+          <p:nvPr>
+            <p:ph type="sldNum" sz="quarter" idx="4"/>
+          </p:nvPr>
+        </p:nvSpPr>
+        <p:spPr>
+          <a:xfrm>
+            <a:off x="9123218" y="6328641"/>
+            <a:ext cx="2743200" cy="365125"/>
+          </a:xfrm>
+          <a:prstGeom prst="rect">
+            <a:avLst/>
+          </a:prstGeom>
+        </p:spPr>
+        <p:txBody>
+          <a:bodyPr vert="horz" lIns="91440" tIns="45720" rIns="91440" bIns="45720" rtlCol="0" anchor="ctr"/>
+          <a:lstStyle>
+            <a:lvl1pPr algn="r">
+              <a:defRPr sz="1200">
+                <a:solidFill>
+                  <a:schemeClr val="tx1">
+                    <a:tint val="75000"/>
+                  </a:schemeClr>
+                </a:solidFill>
+              </a:defRPr>
+            </a:lvl1pPr>
+          </a:lstStyle>
+          <a:p>
+            <a:fld id="{4D95382D-0D49-4DA8-905C-596FF0813096}" type="slidenum">
+              <a:rPr lang="en-US" smtClean="0"/>
+              <a:t>‹#›</a:t>
+            </a:fld>
+            <a:endParaRPr lang="en-US"/>
+          </a:p>
+        </p:txBody>
+      </p:sp>
     </p:spTree>
     <p:extLst>
       <p:ext uri="{BB962C8B-B14F-4D97-AF65-F5344CB8AC3E}">
@@ -2355,6 +2543,53 @@
           </a:fontRef>
         </p:style>
       </p:cxnSp>
+      <p:sp>
+        <p:nvSpPr>
+          <p:cNvPr id="11" name="Slide Number Placeholder 1">
+            <a:extLst>
+              <a:ext uri="{FF2B5EF4-FFF2-40B4-BE49-F238E27FC236}">
+                <a16:creationId xmlns:a16="http://schemas.microsoft.com/office/drawing/2014/main" id="{B08237F8-0252-47DD-96BA-431DCB8D1698}"/>
+              </a:ext>
+            </a:extLst>
+          </p:cNvPr>
+          <p:cNvSpPr>
+            <a:spLocks noGrp="1"/>
+          </p:cNvSpPr>
+          <p:nvPr>
+            <p:ph type="sldNum" sz="quarter" idx="4"/>
+          </p:nvPr>
+        </p:nvSpPr>
+        <p:spPr>
+          <a:xfrm>
+            <a:off x="9123218" y="6328641"/>
+            <a:ext cx="2743200" cy="365125"/>
+          </a:xfrm>
+          <a:prstGeom prst="rect">
+            <a:avLst/>
+          </a:prstGeom>
+        </p:spPr>
+        <p:txBody>
+          <a:bodyPr vert="horz" lIns="91440" tIns="45720" rIns="91440" bIns="45720" rtlCol="0" anchor="ctr"/>
+          <a:lstStyle>
+            <a:lvl1pPr algn="r">
+              <a:defRPr sz="1200">
+                <a:solidFill>
+                  <a:schemeClr val="tx1">
+                    <a:tint val="75000"/>
+                  </a:schemeClr>
+                </a:solidFill>
+              </a:defRPr>
+            </a:lvl1pPr>
+          </a:lstStyle>
+          <a:p>
+            <a:fld id="{4D95382D-0D49-4DA8-905C-596FF0813096}" type="slidenum">
+              <a:rPr lang="en-US" smtClean="0"/>
+              <a:t>‹#›</a:t>
+            </a:fld>
+            <a:endParaRPr lang="en-US"/>
+          </a:p>
+        </p:txBody>
+      </p:sp>
     </p:spTree>
     <p:extLst>
       <p:ext uri="{BB962C8B-B14F-4D97-AF65-F5344CB8AC3E}">
@@ -2510,6 +2745,53 @@
           </a:fontRef>
         </p:style>
       </p:cxnSp>
+      <p:sp>
+        <p:nvSpPr>
+          <p:cNvPr id="7" name="Slide Number Placeholder 1">
+            <a:extLst>
+              <a:ext uri="{FF2B5EF4-FFF2-40B4-BE49-F238E27FC236}">
+                <a16:creationId xmlns:a16="http://schemas.microsoft.com/office/drawing/2014/main" id="{431090CC-489C-4C05-BABC-30D60BBA9572}"/>
+              </a:ext>
+            </a:extLst>
+          </p:cNvPr>
+          <p:cNvSpPr>
+            <a:spLocks noGrp="1"/>
+          </p:cNvSpPr>
+          <p:nvPr>
+            <p:ph type="sldNum" sz="quarter" idx="4"/>
+          </p:nvPr>
+        </p:nvSpPr>
+        <p:spPr>
+          <a:xfrm>
+            <a:off x="9123218" y="6328641"/>
+            <a:ext cx="2743200" cy="365125"/>
+          </a:xfrm>
+          <a:prstGeom prst="rect">
+            <a:avLst/>
+          </a:prstGeom>
+        </p:spPr>
+        <p:txBody>
+          <a:bodyPr vert="horz" lIns="91440" tIns="45720" rIns="91440" bIns="45720" rtlCol="0" anchor="ctr"/>
+          <a:lstStyle>
+            <a:lvl1pPr algn="r">
+              <a:defRPr sz="1200">
+                <a:solidFill>
+                  <a:schemeClr val="tx1">
+                    <a:tint val="75000"/>
+                  </a:schemeClr>
+                </a:solidFill>
+              </a:defRPr>
+            </a:lvl1pPr>
+          </a:lstStyle>
+          <a:p>
+            <a:fld id="{4D95382D-0D49-4DA8-905C-596FF0813096}" type="slidenum">
+              <a:rPr lang="en-US" smtClean="0"/>
+              <a:t>‹#›</a:t>
+            </a:fld>
+            <a:endParaRPr lang="en-US"/>
+          </a:p>
+        </p:txBody>
+      </p:sp>
     </p:spTree>
     <p:extLst>
       <p:ext uri="{BB962C8B-B14F-4D97-AF65-F5344CB8AC3E}">
@@ -2540,6 +2822,53 @@
           <a:chExt cx="0" cy="0"/>
         </a:xfrm>
       </p:grpSpPr>
+      <p:sp>
+        <p:nvSpPr>
+          <p:cNvPr id="2" name="Slide Number Placeholder 1">
+            <a:extLst>
+              <a:ext uri="{FF2B5EF4-FFF2-40B4-BE49-F238E27FC236}">
+                <a16:creationId xmlns:a16="http://schemas.microsoft.com/office/drawing/2014/main" id="{6E9DD512-EAE5-452E-8E13-9AFA458E1357}"/>
+              </a:ext>
+            </a:extLst>
+          </p:cNvPr>
+          <p:cNvSpPr>
+            <a:spLocks noGrp="1"/>
+          </p:cNvSpPr>
+          <p:nvPr>
+            <p:ph type="sldNum" sz="quarter" idx="4"/>
+          </p:nvPr>
+        </p:nvSpPr>
+        <p:spPr>
+          <a:xfrm>
+            <a:off x="9123218" y="6328641"/>
+            <a:ext cx="2743200" cy="365125"/>
+          </a:xfrm>
+          <a:prstGeom prst="rect">
+            <a:avLst/>
+          </a:prstGeom>
+        </p:spPr>
+        <p:txBody>
+          <a:bodyPr vert="horz" lIns="91440" tIns="45720" rIns="91440" bIns="45720" rtlCol="0" anchor="ctr"/>
+          <a:lstStyle>
+            <a:lvl1pPr algn="r">
+              <a:defRPr sz="1200">
+                <a:solidFill>
+                  <a:schemeClr val="tx1">
+                    <a:tint val="75000"/>
+                  </a:schemeClr>
+                </a:solidFill>
+              </a:defRPr>
+            </a:lvl1pPr>
+          </a:lstStyle>
+          <a:p>
+            <a:fld id="{4D95382D-0D49-4DA8-905C-596FF0813096}" type="slidenum">
+              <a:rPr lang="en-US" smtClean="0"/>
+              <a:t>‹#›</a:t>
+            </a:fld>
+            <a:endParaRPr lang="en-US"/>
+          </a:p>
+        </p:txBody>
+      </p:sp>
     </p:spTree>
     <p:extLst>
       <p:ext uri="{BB962C8B-B14F-4D97-AF65-F5344CB8AC3E}">
@@ -3294,6 +3623,53 @@
           </a:p>
         </p:txBody>
       </p:sp>
+      <p:sp>
+        <p:nvSpPr>
+          <p:cNvPr id="15" name="Slide Number Placeholder 1">
+            <a:extLst>
+              <a:ext uri="{FF2B5EF4-FFF2-40B4-BE49-F238E27FC236}">
+                <a16:creationId xmlns:a16="http://schemas.microsoft.com/office/drawing/2014/main" id="{93C1505A-C1BE-4A5B-812D-722646C11A9D}"/>
+              </a:ext>
+            </a:extLst>
+          </p:cNvPr>
+          <p:cNvSpPr>
+            <a:spLocks noGrp="1"/>
+          </p:cNvSpPr>
+          <p:nvPr>
+            <p:ph type="sldNum" sz="quarter" idx="4"/>
+          </p:nvPr>
+        </p:nvSpPr>
+        <p:spPr>
+          <a:xfrm>
+            <a:off x="9123218" y="6328641"/>
+            <a:ext cx="2743200" cy="365125"/>
+          </a:xfrm>
+          <a:prstGeom prst="rect">
+            <a:avLst/>
+          </a:prstGeom>
+        </p:spPr>
+        <p:txBody>
+          <a:bodyPr vert="horz" lIns="91440" tIns="45720" rIns="91440" bIns="45720" rtlCol="0" anchor="ctr"/>
+          <a:lstStyle>
+            <a:lvl1pPr algn="r">
+              <a:defRPr sz="1200">
+                <a:solidFill>
+                  <a:schemeClr val="tx1">
+                    <a:tint val="75000"/>
+                  </a:schemeClr>
+                </a:solidFill>
+              </a:defRPr>
+            </a:lvl1pPr>
+          </a:lstStyle>
+          <a:p>
+            <a:fld id="{4D95382D-0D49-4DA8-905C-596FF0813096}" type="slidenum">
+              <a:rPr lang="en-US" smtClean="0"/>
+              <a:t>‹#›</a:t>
+            </a:fld>
+            <a:endParaRPr lang="en-US"/>
+          </a:p>
+        </p:txBody>
+      </p:sp>
     </p:spTree>
     <p:extLst>
       <p:ext uri="{BB962C8B-B14F-4D97-AF65-F5344CB8AC3E}">
@@ -3485,6 +3861,53 @@
           </a:fontRef>
         </p:style>
       </p:cxnSp>
+      <p:sp>
+        <p:nvSpPr>
+          <p:cNvPr id="6" name="Slide Number Placeholder 1">
+            <a:extLst>
+              <a:ext uri="{FF2B5EF4-FFF2-40B4-BE49-F238E27FC236}">
+                <a16:creationId xmlns:a16="http://schemas.microsoft.com/office/drawing/2014/main" id="{769A8E71-8613-4F96-B87A-49EEF10FA788}"/>
+              </a:ext>
+            </a:extLst>
+          </p:cNvPr>
+          <p:cNvSpPr>
+            <a:spLocks noGrp="1"/>
+          </p:cNvSpPr>
+          <p:nvPr>
+            <p:ph type="sldNum" sz="quarter" idx="4"/>
+          </p:nvPr>
+        </p:nvSpPr>
+        <p:spPr>
+          <a:xfrm>
+            <a:off x="9123218" y="6328641"/>
+            <a:ext cx="2743200" cy="365125"/>
+          </a:xfrm>
+          <a:prstGeom prst="rect">
+            <a:avLst/>
+          </a:prstGeom>
+        </p:spPr>
+        <p:txBody>
+          <a:bodyPr vert="horz" lIns="91440" tIns="45720" rIns="91440" bIns="45720" rtlCol="0" anchor="ctr"/>
+          <a:lstStyle>
+            <a:lvl1pPr algn="r">
+              <a:defRPr sz="1200">
+                <a:solidFill>
+                  <a:schemeClr val="tx1">
+                    <a:tint val="75000"/>
+                  </a:schemeClr>
+                </a:solidFill>
+              </a:defRPr>
+            </a:lvl1pPr>
+          </a:lstStyle>
+          <a:p>
+            <a:fld id="{4D95382D-0D49-4DA8-905C-596FF0813096}" type="slidenum">
+              <a:rPr lang="en-US" smtClean="0"/>
+              <a:t>‹#›</a:t>
+            </a:fld>
+            <a:endParaRPr lang="en-US"/>
+          </a:p>
+        </p:txBody>
+      </p:sp>
     </p:spTree>
     <p:extLst>
       <p:ext uri="{BB962C8B-B14F-4D97-AF65-F5344CB8AC3E}">
@@ -3692,6 +4115,53 @@
           </a:fontRef>
         </p:style>
       </p:cxnSp>
+      <p:sp>
+        <p:nvSpPr>
+          <p:cNvPr id="8" name="Slide Number Placeholder 1">
+            <a:extLst>
+              <a:ext uri="{FF2B5EF4-FFF2-40B4-BE49-F238E27FC236}">
+                <a16:creationId xmlns:a16="http://schemas.microsoft.com/office/drawing/2014/main" id="{4314A15B-D3BF-4498-A2F8-23F638890C04}"/>
+              </a:ext>
+            </a:extLst>
+          </p:cNvPr>
+          <p:cNvSpPr>
+            <a:spLocks noGrp="1"/>
+          </p:cNvSpPr>
+          <p:nvPr>
+            <p:ph type="sldNum" sz="quarter" idx="4"/>
+          </p:nvPr>
+        </p:nvSpPr>
+        <p:spPr>
+          <a:xfrm>
+            <a:off x="9123218" y="6328641"/>
+            <a:ext cx="2743200" cy="365125"/>
+          </a:xfrm>
+          <a:prstGeom prst="rect">
+            <a:avLst/>
+          </a:prstGeom>
+        </p:spPr>
+        <p:txBody>
+          <a:bodyPr vert="horz" lIns="91440" tIns="45720" rIns="91440" bIns="45720" rtlCol="0" anchor="ctr"/>
+          <a:lstStyle>
+            <a:lvl1pPr algn="r">
+              <a:defRPr sz="1200">
+                <a:solidFill>
+                  <a:schemeClr val="tx1">
+                    <a:tint val="75000"/>
+                  </a:schemeClr>
+                </a:solidFill>
+              </a:defRPr>
+            </a:lvl1pPr>
+          </a:lstStyle>
+          <a:p>
+            <a:fld id="{4D95382D-0D49-4DA8-905C-596FF0813096}" type="slidenum">
+              <a:rPr lang="en-US" smtClean="0"/>
+              <a:t>‹#›</a:t>
+            </a:fld>
+            <a:endParaRPr lang="en-US"/>
+          </a:p>
+        </p:txBody>
+      </p:sp>
     </p:spTree>
     <p:extLst>
       <p:ext uri="{BB962C8B-B14F-4D97-AF65-F5344CB8AC3E}">
@@ -3899,6 +4369,53 @@
           </a:fontRef>
         </p:style>
       </p:cxnSp>
+      <p:sp>
+        <p:nvSpPr>
+          <p:cNvPr id="8" name="Slide Number Placeholder 1">
+            <a:extLst>
+              <a:ext uri="{FF2B5EF4-FFF2-40B4-BE49-F238E27FC236}">
+                <a16:creationId xmlns:a16="http://schemas.microsoft.com/office/drawing/2014/main" id="{17A3E2C8-FD45-4E18-BD6F-AF523E39B4BE}"/>
+              </a:ext>
+            </a:extLst>
+          </p:cNvPr>
+          <p:cNvSpPr>
+            <a:spLocks noGrp="1"/>
+          </p:cNvSpPr>
+          <p:nvPr>
+            <p:ph type="sldNum" sz="quarter" idx="4"/>
+          </p:nvPr>
+        </p:nvSpPr>
+        <p:spPr>
+          <a:xfrm>
+            <a:off x="9123218" y="6328641"/>
+            <a:ext cx="2743200" cy="365125"/>
+          </a:xfrm>
+          <a:prstGeom prst="rect">
+            <a:avLst/>
+          </a:prstGeom>
+        </p:spPr>
+        <p:txBody>
+          <a:bodyPr vert="horz" lIns="91440" tIns="45720" rIns="91440" bIns="45720" rtlCol="0" anchor="ctr"/>
+          <a:lstStyle>
+            <a:lvl1pPr algn="r">
+              <a:defRPr sz="1200">
+                <a:solidFill>
+                  <a:schemeClr val="tx1">
+                    <a:tint val="75000"/>
+                  </a:schemeClr>
+                </a:solidFill>
+              </a:defRPr>
+            </a:lvl1pPr>
+          </a:lstStyle>
+          <a:p>
+            <a:fld id="{4D95382D-0D49-4DA8-905C-596FF0813096}" type="slidenum">
+              <a:rPr lang="en-US" smtClean="0"/>
+              <a:t>‹#›</a:t>
+            </a:fld>
+            <a:endParaRPr lang="en-US"/>
+          </a:p>
+        </p:txBody>
+      </p:sp>
     </p:spTree>
     <p:extLst>
       <p:ext uri="{BB962C8B-B14F-4D97-AF65-F5344CB8AC3E}">
@@ -3946,6 +4463,53 @@
           <a:chExt cx="0" cy="0"/>
         </a:xfrm>
       </p:grpSpPr>
+      <p:sp>
+        <p:nvSpPr>
+          <p:cNvPr id="2" name="Slide Number Placeholder 1">
+            <a:extLst>
+              <a:ext uri="{FF2B5EF4-FFF2-40B4-BE49-F238E27FC236}">
+                <a16:creationId xmlns:a16="http://schemas.microsoft.com/office/drawing/2014/main" id="{114D628E-A40F-4BA5-B98F-03B1CE28C29B}"/>
+              </a:ext>
+            </a:extLst>
+          </p:cNvPr>
+          <p:cNvSpPr>
+            <a:spLocks noGrp="1"/>
+          </p:cNvSpPr>
+          <p:nvPr>
+            <p:ph type="sldNum" sz="quarter" idx="4"/>
+          </p:nvPr>
+        </p:nvSpPr>
+        <p:spPr>
+          <a:xfrm>
+            <a:off x="9123218" y="6328641"/>
+            <a:ext cx="2743200" cy="365125"/>
+          </a:xfrm>
+          <a:prstGeom prst="rect">
+            <a:avLst/>
+          </a:prstGeom>
+        </p:spPr>
+        <p:txBody>
+          <a:bodyPr vert="horz" lIns="91440" tIns="45720" rIns="91440" bIns="45720" rtlCol="0" anchor="ctr"/>
+          <a:lstStyle>
+            <a:lvl1pPr algn="r">
+              <a:defRPr sz="1200">
+                <a:solidFill>
+                  <a:schemeClr val="tx1">
+                    <a:tint val="75000"/>
+                  </a:schemeClr>
+                </a:solidFill>
+              </a:defRPr>
+            </a:lvl1pPr>
+          </a:lstStyle>
+          <a:p>
+            <a:fld id="{4D95382D-0D49-4DA8-905C-596FF0813096}" type="slidenum">
+              <a:rPr lang="en-US" smtClean="0"/>
+              <a:t>‹#›</a:t>
+            </a:fld>
+            <a:endParaRPr lang="en-US"/>
+          </a:p>
+        </p:txBody>
+      </p:sp>
     </p:spTree>
     <p:extLst>
       <p:ext uri="{BB962C8B-B14F-4D97-AF65-F5344CB8AC3E}">
@@ -3967,6 +4531,7 @@
     <p:sldLayoutId id="2147483716" r:id="rId10"/>
     <p:sldLayoutId id="2147483731" r:id="rId11"/>
   </p:sldLayoutIdLst>
+  <p:hf hdr="0" ftr="0" dt="0"/>
   <p:txStyles>
     <p:titleStyle>
       <a:lvl1pPr algn="l" defTabSz="914400" rtl="0" eaLnBrk="1" latinLnBrk="0" hangingPunct="1">
@@ -4472,6 +5037,35 @@
           </a:p>
         </p:txBody>
       </p:sp>
+      <p:sp>
+        <p:nvSpPr>
+          <p:cNvPr id="4" name="Slide Number Placeholder 3">
+            <a:extLst>
+              <a:ext uri="{FF2B5EF4-FFF2-40B4-BE49-F238E27FC236}">
+                <a16:creationId xmlns:a16="http://schemas.microsoft.com/office/drawing/2014/main" id="{C85FF980-4A97-4F42-A52B-EAFDDF116853}"/>
+              </a:ext>
+            </a:extLst>
+          </p:cNvPr>
+          <p:cNvSpPr>
+            <a:spLocks noGrp="1"/>
+          </p:cNvSpPr>
+          <p:nvPr>
+            <p:ph type="sldNum" sz="quarter" idx="4"/>
+          </p:nvPr>
+        </p:nvSpPr>
+        <p:spPr/>
+        <p:txBody>
+          <a:bodyPr/>
+          <a:lstStyle/>
+          <a:p>
+            <a:fld id="{4D95382D-0D49-4DA8-905C-596FF0813096}" type="slidenum">
+              <a:rPr lang="en-US" smtClean="0"/>
+              <a:t>2</a:t>
+            </a:fld>
+            <a:endParaRPr lang="en-US"/>
+          </a:p>
+        </p:txBody>
+      </p:sp>
     </p:spTree>
     <p:extLst>
       <p:ext uri="{BB962C8B-B14F-4D97-AF65-F5344CB8AC3E}">
@@ -4527,6 +5121,35 @@
           </a:p>
         </p:txBody>
       </p:sp>
+      <p:sp>
+        <p:nvSpPr>
+          <p:cNvPr id="2" name="Slide Number Placeholder 1">
+            <a:extLst>
+              <a:ext uri="{FF2B5EF4-FFF2-40B4-BE49-F238E27FC236}">
+                <a16:creationId xmlns:a16="http://schemas.microsoft.com/office/drawing/2014/main" id="{8805D478-04CD-47BC-8C94-067EC1239EDB}"/>
+              </a:ext>
+            </a:extLst>
+          </p:cNvPr>
+          <p:cNvSpPr>
+            <a:spLocks noGrp="1"/>
+          </p:cNvSpPr>
+          <p:nvPr>
+            <p:ph type="sldNum" sz="quarter" idx="4"/>
+          </p:nvPr>
+        </p:nvSpPr>
+        <p:spPr/>
+        <p:txBody>
+          <a:bodyPr/>
+          <a:lstStyle/>
+          <a:p>
+            <a:fld id="{4D95382D-0D49-4DA8-905C-596FF0813096}" type="slidenum">
+              <a:rPr lang="en-US" smtClean="0"/>
+              <a:t>3</a:t>
+            </a:fld>
+            <a:endParaRPr lang="en-US"/>
+          </a:p>
+        </p:txBody>
+      </p:sp>
     </p:spTree>
     <p:extLst>
       <p:ext uri="{BB962C8B-B14F-4D97-AF65-F5344CB8AC3E}">
@@ -4578,6 +5201,35 @@
           <a:bodyPr/>
           <a:lstStyle/>
           <a:p>
+            <a:endParaRPr lang="en-US" dirty="0"/>
+          </a:p>
+        </p:txBody>
+      </p:sp>
+      <p:sp>
+        <p:nvSpPr>
+          <p:cNvPr id="2" name="Slide Number Placeholder 1">
+            <a:extLst>
+              <a:ext uri="{FF2B5EF4-FFF2-40B4-BE49-F238E27FC236}">
+                <a16:creationId xmlns:a16="http://schemas.microsoft.com/office/drawing/2014/main" id="{34E3DAD7-4AA6-454D-8E6F-D5F27370D425}"/>
+              </a:ext>
+            </a:extLst>
+          </p:cNvPr>
+          <p:cNvSpPr>
+            <a:spLocks noGrp="1"/>
+          </p:cNvSpPr>
+          <p:nvPr>
+            <p:ph type="sldNum" sz="quarter" idx="4"/>
+          </p:nvPr>
+        </p:nvSpPr>
+        <p:spPr/>
+        <p:txBody>
+          <a:bodyPr/>
+          <a:lstStyle/>
+          <a:p>
+            <a:fld id="{4D95382D-0D49-4DA8-905C-596FF0813096}" type="slidenum">
+              <a:rPr lang="en-US" smtClean="0"/>
+              <a:t>4</a:t>
+            </a:fld>
             <a:endParaRPr lang="en-US"/>
           </a:p>
         </p:txBody>
@@ -4612,6 +5264,35 @@
           <a:chExt cx="0" cy="0"/>
         </a:xfrm>
       </p:grpSpPr>
+      <p:sp>
+        <p:nvSpPr>
+          <p:cNvPr id="2" name="Slide Number Placeholder 1">
+            <a:extLst>
+              <a:ext uri="{FF2B5EF4-FFF2-40B4-BE49-F238E27FC236}">
+                <a16:creationId xmlns:a16="http://schemas.microsoft.com/office/drawing/2014/main" id="{D788DC78-1E01-441D-990E-355DE42B230A}"/>
+              </a:ext>
+            </a:extLst>
+          </p:cNvPr>
+          <p:cNvSpPr>
+            <a:spLocks noGrp="1"/>
+          </p:cNvSpPr>
+          <p:nvPr>
+            <p:ph type="sldNum" sz="quarter" idx="4"/>
+          </p:nvPr>
+        </p:nvSpPr>
+        <p:spPr/>
+        <p:txBody>
+          <a:bodyPr/>
+          <a:lstStyle/>
+          <a:p>
+            <a:fld id="{4D95382D-0D49-4DA8-905C-596FF0813096}" type="slidenum">
+              <a:rPr lang="en-US" smtClean="0"/>
+              <a:t>5</a:t>
+            </a:fld>
+            <a:endParaRPr lang="en-US"/>
+          </a:p>
+        </p:txBody>
+      </p:sp>
     </p:spTree>
     <p:extLst>
       <p:ext uri="{BB962C8B-B14F-4D97-AF65-F5344CB8AC3E}">
@@ -5572,12 +6253,9 @@
 </file>
 
 <file path=customXml/item1.xml><?xml version="1.0" encoding="utf-8"?>
-<?mso-contentType ?>
-<FormTemplates xmlns="http://schemas.microsoft.com/sharepoint/v3/contenttype/forms">
-  <Display>DocumentLibraryForm</Display>
-  <Edit>DocumentLibraryForm</Edit>
-  <New>DocumentLibraryForm</New>
-</FormTemplates>
+<p:properties xmlns:p="http://schemas.microsoft.com/office/2006/metadata/properties" xmlns:xsi="http://www.w3.org/2001/XMLSchema-instance" xmlns:pc="http://schemas.microsoft.com/office/infopath/2007/PartnerControls">
+  <documentManagement/>
+</p:properties>
 </file>
 
 <file path=customXml/item2.xml><?xml version="1.0" encoding="utf-8"?>
@@ -5798,15 +6476,27 @@
 </file>
 
 <file path=customXml/item3.xml><?xml version="1.0" encoding="utf-8"?>
-<p:properties xmlns:p="http://schemas.microsoft.com/office/2006/metadata/properties" xmlns:xsi="http://www.w3.org/2001/XMLSchema-instance" xmlns:pc="http://schemas.microsoft.com/office/infopath/2007/PartnerControls">
-  <documentManagement/>
-</p:properties>
+<?mso-contentType ?>
+<FormTemplates xmlns="http://schemas.microsoft.com/sharepoint/v3/contenttype/forms">
+  <Display>DocumentLibraryForm</Display>
+  <Edit>DocumentLibraryForm</Edit>
+  <New>DocumentLibraryForm</New>
+</FormTemplates>
 </file>
 
 <file path=customXml/itemProps1.xml><?xml version="1.0" encoding="utf-8"?>
-<ds:datastoreItem xmlns:ds="http://schemas.openxmlformats.org/officeDocument/2006/customXml" ds:itemID="{48E7FF02-1CCE-414A-A32E-C33CDAE387AD}">
+<ds:datastoreItem xmlns:ds="http://schemas.openxmlformats.org/officeDocument/2006/customXml" ds:itemID="{8A5BDD5F-8B67-47D0-A097-B15106DA8129}">
   <ds:schemaRefs>
-    <ds:schemaRef ds:uri="http://schemas.microsoft.com/sharepoint/v3/contenttype/forms"/>
+    <ds:schemaRef ds:uri="http://schemas.microsoft.com/office/2006/metadata/properties"/>
+    <ds:schemaRef ds:uri="http://purl.org/dc/elements/1.1/"/>
+    <ds:schemaRef ds:uri="http://schemas.openxmlformats.org/package/2006/metadata/core-properties"/>
+    <ds:schemaRef ds:uri="http://purl.org/dc/terms/"/>
+    <ds:schemaRef ds:uri="http://schemas.microsoft.com/office/2006/documentManagement/types"/>
+    <ds:schemaRef ds:uri="d892e258-47e1-49b8-98b0-9d768464ce96"/>
+    <ds:schemaRef ds:uri="http://purl.org/dc/dcmitype/"/>
+    <ds:schemaRef ds:uri="http://schemas.microsoft.com/office/infopath/2007/PartnerControls"/>
+    <ds:schemaRef ds:uri="695da9f2-3657-4b38-8a5b-a3d6f5a06c2b"/>
+    <ds:schemaRef ds:uri="http://www.w3.org/XML/1998/namespace"/>
   </ds:schemaRefs>
 </ds:datastoreItem>
 </file>
@@ -5831,18 +6521,9 @@
 </file>
 
 <file path=customXml/itemProps3.xml><?xml version="1.0" encoding="utf-8"?>
-<ds:datastoreItem xmlns:ds="http://schemas.openxmlformats.org/officeDocument/2006/customXml" ds:itemID="{8A5BDD5F-8B67-47D0-A097-B15106DA8129}">
+<ds:datastoreItem xmlns:ds="http://schemas.openxmlformats.org/officeDocument/2006/customXml" ds:itemID="{48E7FF02-1CCE-414A-A32E-C33CDAE387AD}">
   <ds:schemaRefs>
-    <ds:schemaRef ds:uri="http://schemas.microsoft.com/office/2006/metadata/properties"/>
-    <ds:schemaRef ds:uri="http://purl.org/dc/elements/1.1/"/>
-    <ds:schemaRef ds:uri="http://schemas.openxmlformats.org/package/2006/metadata/core-properties"/>
-    <ds:schemaRef ds:uri="http://purl.org/dc/terms/"/>
-    <ds:schemaRef ds:uri="http://schemas.microsoft.com/office/2006/documentManagement/types"/>
-    <ds:schemaRef ds:uri="d892e258-47e1-49b8-98b0-9d768464ce96"/>
-    <ds:schemaRef ds:uri="http://purl.org/dc/dcmitype/"/>
-    <ds:schemaRef ds:uri="http://schemas.microsoft.com/office/infopath/2007/PartnerControls"/>
-    <ds:schemaRef ds:uri="695da9f2-3657-4b38-8a5b-a3d6f5a06c2b"/>
-    <ds:schemaRef ds:uri="http://www.w3.org/XML/1998/namespace"/>
+    <ds:schemaRef ds:uri="http://schemas.microsoft.com/sharepoint/v3/contenttype/forms"/>
   </ds:schemaRefs>
 </ds:datastoreItem>
 </file>
</xml_diff>